<commit_message>
added different values for machine learning
</commit_message>
<xml_diff>
--- a/Does Alcohol cause happiness.pptx
+++ b/Does Alcohol cause happiness.pptx
@@ -10,13 +10,15 @@
     <p:sldId id="263" r:id="rId7"/>
     <p:sldId id="262" r:id="rId8"/>
     <p:sldId id="269" r:id="rId9"/>
-    <p:sldId id="264" r:id="rId10"/>
-    <p:sldId id="272" r:id="rId11"/>
-    <p:sldId id="270" r:id="rId12"/>
-    <p:sldId id="271" r:id="rId13"/>
-    <p:sldId id="265" r:id="rId14"/>
-    <p:sldId id="268" r:id="rId15"/>
-    <p:sldId id="267" r:id="rId16"/>
+    <p:sldId id="274" r:id="rId10"/>
+    <p:sldId id="273" r:id="rId11"/>
+    <p:sldId id="264" r:id="rId12"/>
+    <p:sldId id="272" r:id="rId13"/>
+    <p:sldId id="270" r:id="rId14"/>
+    <p:sldId id="271" r:id="rId15"/>
+    <p:sldId id="265" r:id="rId16"/>
+    <p:sldId id="268" r:id="rId17"/>
+    <p:sldId id="267" r:id="rId18"/>
   </p:sldIdLst>
   <p:sldSz cx="12192000" cy="6858000"/>
   <p:notesSz cx="6858000" cy="9144000"/>
@@ -3539,7 +3541,7 @@
           <a:p>
             <a:fld id="{EA0C0817-A112-4847-8014-A94B7D2A4EA3}" type="datetime1">
               <a:rPr lang="en-US" smtClean="0"/>
-              <a:t>4/6/2020</a:t>
+              <a:t>4/7/2020</a:t>
             </a:fld>
             <a:endParaRPr lang="en-US" dirty="0"/>
           </a:p>
@@ -3741,7 +3743,7 @@
           <a:p>
             <a:fld id="{7332B432-ACDA-4023-A761-2BAB76577B62}" type="datetime1">
               <a:rPr lang="en-US" smtClean="0"/>
-              <a:t>4/6/2020</a:t>
+              <a:t>4/7/2020</a:t>
             </a:fld>
             <a:endParaRPr lang="en-US" dirty="0"/>
           </a:p>
@@ -4340,7 +4342,7 @@
           <a:p>
             <a:fld id="{D9C646AA-F36E-4540-911D-FFFC0A0EF24A}" type="datetime1">
               <a:rPr lang="en-US" smtClean="0"/>
-              <a:t>4/6/2020</a:t>
+              <a:t>4/7/2020</a:t>
             </a:fld>
             <a:endParaRPr lang="en-US" dirty="0"/>
           </a:p>
@@ -4660,7 +4662,7 @@
           <a:p>
             <a:fld id="{69186D26-FA5F-4637-B602-B7C2DC34CFD4}" type="datetime1">
               <a:rPr lang="en-US" smtClean="0"/>
-              <a:t>4/6/2020</a:t>
+              <a:t>4/7/2020</a:t>
             </a:fld>
             <a:endParaRPr lang="en-US" dirty="0"/>
           </a:p>
@@ -5097,7 +5099,7 @@
           <a:p>
             <a:fld id="{8A7F15D8-96D1-4781-BC50-CA8A088B2FE4}" type="datetime1">
               <a:rPr lang="en-US" smtClean="0"/>
-              <a:t>4/6/2020</a:t>
+              <a:t>4/7/2020</a:t>
             </a:fld>
             <a:endParaRPr lang="en-US" dirty="0"/>
           </a:p>
@@ -5215,7 +5217,7 @@
           <a:p>
             <a:fld id="{F9A96C99-B8F8-4528-BD05-0E16E943DC09}" type="datetime1">
               <a:rPr lang="en-US" smtClean="0"/>
-              <a:t>4/6/2020</a:t>
+              <a:t>4/7/2020</a:t>
             </a:fld>
             <a:endParaRPr lang="en-US" dirty="0"/>
           </a:p>
@@ -5310,7 +5312,7 @@
           <a:p>
             <a:fld id="{03636942-C211-4B28-8DBD-C953E00AF71B}" type="datetime1">
               <a:rPr lang="en-US" smtClean="0"/>
-              <a:t>4/6/2020</a:t>
+              <a:t>4/7/2020</a:t>
             </a:fld>
             <a:endParaRPr lang="en-US" dirty="0"/>
           </a:p>
@@ -5727,7 +5729,7 @@
           <a:p>
             <a:fld id="{7E8D12A6-918A-48BD-8CB9-CA713993B0EA}" type="datetime1">
               <a:rPr lang="en-US" smtClean="0"/>
-              <a:t>4/6/2020</a:t>
+              <a:t>4/7/2020</a:t>
             </a:fld>
             <a:endParaRPr lang="en-US" dirty="0"/>
           </a:p>
@@ -5989,7 +5991,7 @@
             <a:fld id="{E778CE86-875F-4587-BCF6-FA054AFC0D53}" type="datetime1">
               <a:rPr lang="en-US" smtClean="0"/>
               <a:pPr/>
-              <a:t>4/6/2020</a:t>
+              <a:t>4/7/2020</a:t>
             </a:fld>
             <a:endParaRPr lang="en-US" dirty="0"/>
           </a:p>
@@ -6505,7 +6507,7 @@
           <a:p>
             <a:fld id="{F6FA2B21-3FCD-4721-B95C-427943F61125}" type="datetime1">
               <a:rPr lang="en-US" smtClean="0"/>
-              <a:t>4/6/2020</a:t>
+              <a:t>4/7/2020</a:t>
             </a:fld>
             <a:endParaRPr lang="en-US" dirty="0"/>
           </a:p>
@@ -7213,6 +7215,193 @@
 <file path=ppt/slides/slide10.xml><?xml version="1.0" encoding="utf-8"?>
 <p:sld xmlns:a="http://schemas.openxmlformats.org/drawingml/2006/main" xmlns:r="http://schemas.openxmlformats.org/officeDocument/2006/relationships" xmlns:p="http://schemas.openxmlformats.org/presentationml/2006/main">
   <p:cSld>
+    <p:spTree>
+      <p:nvGrpSpPr>
+        <p:cNvPr id="1" name=""/>
+        <p:cNvGrpSpPr/>
+        <p:nvPr/>
+      </p:nvGrpSpPr>
+      <p:grpSpPr>
+        <a:xfrm>
+          <a:off x="0" y="0"/>
+          <a:ext cx="0" cy="0"/>
+          <a:chOff x="0" y="0"/>
+          <a:chExt cx="0" cy="0"/>
+        </a:xfrm>
+      </p:grpSpPr>
+      <p:sp>
+        <p:nvSpPr>
+          <p:cNvPr id="2" name="Title 1">
+            <a:extLst>
+              <a:ext uri="{FF2B5EF4-FFF2-40B4-BE49-F238E27FC236}">
+                <a16:creationId xmlns:a16="http://schemas.microsoft.com/office/drawing/2014/main" id="{A1CB3ED1-2E78-4E9E-B113-73B111BAC740}"/>
+              </a:ext>
+            </a:extLst>
+          </p:cNvPr>
+          <p:cNvSpPr>
+            <a:spLocks noGrp="1"/>
+          </p:cNvSpPr>
+          <p:nvPr>
+            <p:ph type="title"/>
+          </p:nvPr>
+        </p:nvSpPr>
+        <p:spPr/>
+        <p:txBody>
+          <a:bodyPr/>
+          <a:lstStyle/>
+          <a:p>
+            <a:r>
+              <a:rPr lang="en-US" dirty="0"/>
+              <a:t>Breweries vs. Happiness Score</a:t>
+            </a:r>
+          </a:p>
+        </p:txBody>
+      </p:sp>
+      <p:pic>
+        <p:nvPicPr>
+          <p:cNvPr id="5" name="Content Placeholder 4" descr="A close up of a map&#10;&#10;Description automatically generated">
+            <a:extLst>
+              <a:ext uri="{FF2B5EF4-FFF2-40B4-BE49-F238E27FC236}">
+                <a16:creationId xmlns:a16="http://schemas.microsoft.com/office/drawing/2014/main" id="{89544FB2-44C9-4B1C-A6F3-AB5DDD808BE7}"/>
+              </a:ext>
+            </a:extLst>
+          </p:cNvPr>
+          <p:cNvPicPr>
+            <a:picLocks noGrp="1" noChangeAspect="1"/>
+          </p:cNvPicPr>
+          <p:nvPr>
+            <p:ph idx="1"/>
+          </p:nvPr>
+        </p:nvPicPr>
+        <p:blipFill>
+          <a:blip r:embed="rId2"/>
+          <a:stretch>
+            <a:fillRect/>
+          </a:stretch>
+        </p:blipFill>
+        <p:spPr>
+          <a:xfrm>
+            <a:off x="2199633" y="1684421"/>
+            <a:ext cx="9369731" cy="4612463"/>
+          </a:xfrm>
+        </p:spPr>
+      </p:pic>
+    </p:spTree>
+    <p:extLst>
+      <p:ext uri="{BB962C8B-B14F-4D97-AF65-F5344CB8AC3E}">
+        <p14:creationId xmlns:p14="http://schemas.microsoft.com/office/powerpoint/2010/main" val="2040439502"/>
+      </p:ext>
+    </p:extLst>
+  </p:cSld>
+  <p:clrMapOvr>
+    <a:masterClrMapping/>
+  </p:clrMapOvr>
+</p:sld>
+</file>
+
+<file path=ppt/slides/slide11.xml><?xml version="1.0" encoding="utf-8"?>
+<p:sld xmlns:a="http://schemas.openxmlformats.org/drawingml/2006/main" xmlns:r="http://schemas.openxmlformats.org/officeDocument/2006/relationships" xmlns:p="http://schemas.openxmlformats.org/presentationml/2006/main">
+  <p:cSld>
+    <p:spTree>
+      <p:nvGrpSpPr>
+        <p:cNvPr id="1" name=""/>
+        <p:cNvGrpSpPr/>
+        <p:nvPr/>
+      </p:nvGrpSpPr>
+      <p:grpSpPr>
+        <a:xfrm>
+          <a:off x="0" y="0"/>
+          <a:ext cx="0" cy="0"/>
+          <a:chOff x="0" y="0"/>
+          <a:chExt cx="0" cy="0"/>
+        </a:xfrm>
+      </p:grpSpPr>
+      <p:sp>
+        <p:nvSpPr>
+          <p:cNvPr id="2" name="Title 1">
+            <a:extLst>
+              <a:ext uri="{FF2B5EF4-FFF2-40B4-BE49-F238E27FC236}">
+                <a16:creationId xmlns:a16="http://schemas.microsoft.com/office/drawing/2014/main" id="{381ECE03-28E2-4794-BBB5-37003229C94A}"/>
+              </a:ext>
+            </a:extLst>
+          </p:cNvPr>
+          <p:cNvSpPr>
+            <a:spLocks noGrp="1"/>
+          </p:cNvSpPr>
+          <p:nvPr>
+            <p:ph type="title"/>
+          </p:nvPr>
+        </p:nvSpPr>
+        <p:spPr/>
+        <p:txBody>
+          <a:bodyPr/>
+          <a:lstStyle/>
+          <a:p>
+            <a:r>
+              <a:rPr lang="en-US" dirty="0"/>
+              <a:t>Wineries vs. Happiness Score</a:t>
+            </a:r>
+          </a:p>
+        </p:txBody>
+      </p:sp>
+      <p:pic>
+        <p:nvPicPr>
+          <p:cNvPr id="5" name="Content Placeholder 4" descr="A close up of a map&#10;&#10;Description automatically generated">
+            <a:extLst>
+              <a:ext uri="{FF2B5EF4-FFF2-40B4-BE49-F238E27FC236}">
+                <a16:creationId xmlns:a16="http://schemas.microsoft.com/office/drawing/2014/main" id="{6E6BDC56-2D04-4B3A-A251-B3C500B80DF0}"/>
+              </a:ext>
+            </a:extLst>
+          </p:cNvPr>
+          <p:cNvPicPr>
+            <a:picLocks noGrp="1" noChangeAspect="1"/>
+          </p:cNvPicPr>
+          <p:nvPr>
+            <p:ph idx="1"/>
+          </p:nvPr>
+        </p:nvPicPr>
+        <p:blipFill>
+          <a:blip r:embed="rId2"/>
+          <a:stretch>
+            <a:fillRect/>
+          </a:stretch>
+        </p:blipFill>
+        <p:spPr>
+          <a:xfrm>
+            <a:off x="2099976" y="1615671"/>
+            <a:ext cx="9500339" cy="4722466"/>
+          </a:xfrm>
+          <a:prstGeom prst="rect">
+            <a:avLst/>
+          </a:prstGeom>
+          <a:ln>
+            <a:noFill/>
+          </a:ln>
+          <a:effectLst>
+            <a:outerShdw blurRad="292100" dist="139700" dir="2700000" algn="tl" rotWithShape="0">
+              <a:srgbClr val="333333">
+                <a:alpha val="65000"/>
+              </a:srgbClr>
+            </a:outerShdw>
+          </a:effectLst>
+        </p:spPr>
+      </p:pic>
+    </p:spTree>
+    <p:extLst>
+      <p:ext uri="{BB962C8B-B14F-4D97-AF65-F5344CB8AC3E}">
+        <p14:creationId xmlns:p14="http://schemas.microsoft.com/office/powerpoint/2010/main" val="2828089976"/>
+      </p:ext>
+    </p:extLst>
+  </p:cSld>
+  <p:clrMapOvr>
+    <a:masterClrMapping/>
+  </p:clrMapOvr>
+</p:sld>
+</file>
+
+<file path=ppt/slides/slide12.xml><?xml version="1.0" encoding="utf-8"?>
+<p:sld xmlns:a="http://schemas.openxmlformats.org/drawingml/2006/main" xmlns:r="http://schemas.openxmlformats.org/officeDocument/2006/relationships" xmlns:p="http://schemas.openxmlformats.org/presentationml/2006/main">
+  <p:cSld>
     <p:bg>
       <p:bgPr>
         <a:solidFill>
@@ -7479,7 +7668,7 @@
 </p:sld>
 </file>
 
-<file path=ppt/slides/slide11.xml><?xml version="1.0" encoding="utf-8"?>
+<file path=ppt/slides/slide13.xml><?xml version="1.0" encoding="utf-8"?>
 <p:sld xmlns:a="http://schemas.openxmlformats.org/drawingml/2006/main" xmlns:r="http://schemas.openxmlformats.org/officeDocument/2006/relationships" xmlns:p="http://schemas.openxmlformats.org/presentationml/2006/main">
   <p:cSld>
     <p:spTree>
@@ -7605,7 +7794,7 @@
 </p:sld>
 </file>
 
-<file path=ppt/slides/slide12.xml><?xml version="1.0" encoding="utf-8"?>
+<file path=ppt/slides/slide14.xml><?xml version="1.0" encoding="utf-8"?>
 <p:sld xmlns:a="http://schemas.openxmlformats.org/drawingml/2006/main" xmlns:r="http://schemas.openxmlformats.org/officeDocument/2006/relationships" xmlns:p="http://schemas.openxmlformats.org/presentationml/2006/main">
   <p:cSld>
     <p:spTree>
@@ -8287,6 +8476,12 @@
               <a:t>CSS</a:t>
             </a:r>
           </a:p>
+          <a:p>
+            <a:r>
+              <a:rPr lang="en-US" b="1" dirty="0"/>
+              <a:t>D3</a:t>
+            </a:r>
+          </a:p>
         </p:txBody>
       </p:sp>
       <p:sp>
@@ -8334,7 +8529,7 @@
           <a:p>
             <a:r>
               <a:rPr lang="en-US" b="1" dirty="0"/>
-              <a:t>DROP-DOWN WITH KEY DATA BY STATE</a:t>
+              <a:t>TABLEAU</a:t>
             </a:r>
           </a:p>
           <a:p>
@@ -8389,140 +8584,6 @@
 </file>
 
 <file path=ppt/slides/slide6.xml><?xml version="1.0" encoding="utf-8"?>
-<p:sld xmlns:a="http://schemas.openxmlformats.org/drawingml/2006/main" xmlns:r="http://schemas.openxmlformats.org/officeDocument/2006/relationships" xmlns:p="http://schemas.openxmlformats.org/presentationml/2006/main">
-  <p:cSld>
-    <p:spTree>
-      <p:nvGrpSpPr>
-        <p:cNvPr id="1" name=""/>
-        <p:cNvGrpSpPr/>
-        <p:nvPr/>
-      </p:nvGrpSpPr>
-      <p:grpSpPr>
-        <a:xfrm>
-          <a:off x="0" y="0"/>
-          <a:ext cx="0" cy="0"/>
-          <a:chOff x="0" y="0"/>
-          <a:chExt cx="0" cy="0"/>
-        </a:xfrm>
-      </p:grpSpPr>
-      <p:pic>
-        <p:nvPicPr>
-          <p:cNvPr id="5" name="Picture 4" descr="A screenshot of a social media post&#10;&#10;Description automatically generated">
-            <a:extLst>
-              <a:ext uri="{FF2B5EF4-FFF2-40B4-BE49-F238E27FC236}">
-                <a16:creationId xmlns:a16="http://schemas.microsoft.com/office/drawing/2014/main" id="{20D7C115-4D1E-449B-8D89-6933FCD23E86}"/>
-              </a:ext>
-            </a:extLst>
-          </p:cNvPr>
-          <p:cNvPicPr>
-            <a:picLocks noChangeAspect="1"/>
-          </p:cNvPicPr>
-          <p:nvPr/>
-        </p:nvPicPr>
-        <p:blipFill>
-          <a:blip r:embed="rId2"/>
-          <a:stretch>
-            <a:fillRect/>
-          </a:stretch>
-        </p:blipFill>
-        <p:spPr>
-          <a:xfrm>
-            <a:off x="228599" y="860394"/>
-            <a:ext cx="7696201" cy="5137212"/>
-          </a:xfrm>
-          <a:prstGeom prst="rect">
-            <a:avLst/>
-          </a:prstGeom>
-          <a:noFill/>
-          <a:ln>
-            <a:noFill/>
-          </a:ln>
-        </p:spPr>
-      </p:pic>
-      <p:sp>
-        <p:nvSpPr>
-          <p:cNvPr id="2" name="Title 1">
-            <a:extLst>
-              <a:ext uri="{FF2B5EF4-FFF2-40B4-BE49-F238E27FC236}">
-                <a16:creationId xmlns:a16="http://schemas.microsoft.com/office/drawing/2014/main" id="{7D59C5A6-BA83-44F5-9409-748B6A1D4004}"/>
-              </a:ext>
-            </a:extLst>
-          </p:cNvPr>
-          <p:cNvSpPr>
-            <a:spLocks noGrp="1"/>
-          </p:cNvSpPr>
-          <p:nvPr>
-            <p:ph type="title"/>
-          </p:nvPr>
-        </p:nvSpPr>
-        <p:spPr>
-          <a:xfrm>
-            <a:off x="8477250" y="603504"/>
-            <a:ext cx="3144774" cy="1645920"/>
-          </a:xfrm>
-        </p:spPr>
-        <p:txBody>
-          <a:bodyPr anchor="b">
-            <a:normAutofit/>
-          </a:bodyPr>
-          <a:lstStyle/>
-          <a:p>
-            <a:r>
-              <a:rPr lang="en-US" dirty="0"/>
-              <a:t>Machine Learning</a:t>
-            </a:r>
-          </a:p>
-        </p:txBody>
-      </p:sp>
-      <p:sp>
-        <p:nvSpPr>
-          <p:cNvPr id="3" name="Content Placeholder 2">
-            <a:extLst>
-              <a:ext uri="{FF2B5EF4-FFF2-40B4-BE49-F238E27FC236}">
-                <a16:creationId xmlns:a16="http://schemas.microsoft.com/office/drawing/2014/main" id="{CB7D5AB3-A691-4ADE-9D65-E61687FE5B9E}"/>
-              </a:ext>
-            </a:extLst>
-          </p:cNvPr>
-          <p:cNvSpPr>
-            <a:spLocks noGrp="1"/>
-          </p:cNvSpPr>
-          <p:nvPr>
-            <p:ph type="body" sz="half" idx="2"/>
-          </p:nvPr>
-        </p:nvSpPr>
-        <p:spPr>
-          <a:xfrm>
-            <a:off x="8477250" y="2386584"/>
-            <a:ext cx="3144774" cy="3511296"/>
-          </a:xfrm>
-        </p:spPr>
-        <p:txBody>
-          <a:bodyPr>
-            <a:normAutofit/>
-          </a:bodyPr>
-          <a:lstStyle/>
-          <a:p>
-            <a:r>
-              <a:rPr lang="en-US" dirty="0"/>
-              <a:t>Using the Machine Learning that we learned in class, we attempted to apply the same methodology and linear regression tools to get our own R-squared value.</a:t>
-            </a:r>
-          </a:p>
-        </p:txBody>
-      </p:sp>
-    </p:spTree>
-    <p:extLst>
-      <p:ext uri="{BB962C8B-B14F-4D97-AF65-F5344CB8AC3E}">
-        <p14:creationId xmlns:p14="http://schemas.microsoft.com/office/powerpoint/2010/main" val="3881337227"/>
-      </p:ext>
-    </p:extLst>
-  </p:cSld>
-  <p:clrMapOvr>
-    <a:masterClrMapping/>
-  </p:clrMapOvr>
-</p:sld>
-</file>
-
-<file path=ppt/slides/slide7.xml><?xml version="1.0" encoding="utf-8"?>
 <p:sld xmlns:a="http://schemas.openxmlformats.org/drawingml/2006/main" xmlns:r="http://schemas.openxmlformats.org/officeDocument/2006/relationships" xmlns:p="http://schemas.openxmlformats.org/presentationml/2006/main">
   <p:cSld>
     <p:spTree>
@@ -8611,7 +8672,7 @@
                   <a:schemeClr val="bg1"/>
                 </a:solidFill>
               </a:rPr>
-              <a:t>Tableau</a:t>
+              <a:t>MACHINE LEARNING</a:t>
             </a:r>
           </a:p>
         </p:txBody>
@@ -8619,7 +8680,197 @@
     </p:spTree>
     <p:extLst>
       <p:ext uri="{BB962C8B-B14F-4D97-AF65-F5344CB8AC3E}">
-        <p14:creationId xmlns:p14="http://schemas.microsoft.com/office/powerpoint/2010/main" val="967810589"/>
+        <p14:creationId xmlns:p14="http://schemas.microsoft.com/office/powerpoint/2010/main" val="990950640"/>
+      </p:ext>
+    </p:extLst>
+  </p:cSld>
+  <p:clrMapOvr>
+    <a:masterClrMapping/>
+  </p:clrMapOvr>
+</p:sld>
+</file>
+
+<file path=ppt/slides/slide7.xml><?xml version="1.0" encoding="utf-8"?>
+<p:sld xmlns:a="http://schemas.openxmlformats.org/drawingml/2006/main" xmlns:r="http://schemas.openxmlformats.org/officeDocument/2006/relationships" xmlns:p="http://schemas.openxmlformats.org/presentationml/2006/main">
+  <p:cSld>
+    <p:spTree>
+      <p:nvGrpSpPr>
+        <p:cNvPr id="1" name=""/>
+        <p:cNvGrpSpPr/>
+        <p:nvPr/>
+      </p:nvGrpSpPr>
+      <p:grpSpPr>
+        <a:xfrm>
+          <a:off x="0" y="0"/>
+          <a:ext cx="0" cy="0"/>
+          <a:chOff x="0" y="0"/>
+          <a:chExt cx="0" cy="0"/>
+        </a:xfrm>
+      </p:grpSpPr>
+      <p:sp>
+        <p:nvSpPr>
+          <p:cNvPr id="2" name="Title 1">
+            <a:extLst>
+              <a:ext uri="{FF2B5EF4-FFF2-40B4-BE49-F238E27FC236}">
+                <a16:creationId xmlns:a16="http://schemas.microsoft.com/office/drawing/2014/main" id="{7D59C5A6-BA83-44F5-9409-748B6A1D4004}"/>
+              </a:ext>
+            </a:extLst>
+          </p:cNvPr>
+          <p:cNvSpPr>
+            <a:spLocks noGrp="1"/>
+          </p:cNvSpPr>
+          <p:nvPr>
+            <p:ph type="title"/>
+          </p:nvPr>
+        </p:nvSpPr>
+        <p:spPr>
+          <a:xfrm>
+            <a:off x="8477250" y="603504"/>
+            <a:ext cx="3144774" cy="1645920"/>
+          </a:xfrm>
+        </p:spPr>
+        <p:txBody>
+          <a:bodyPr anchor="b">
+            <a:normAutofit/>
+          </a:bodyPr>
+          <a:lstStyle/>
+          <a:p>
+            <a:r>
+              <a:rPr lang="en-US" dirty="0"/>
+              <a:t>Machine Learning</a:t>
+            </a:r>
+          </a:p>
+        </p:txBody>
+      </p:sp>
+      <p:sp>
+        <p:nvSpPr>
+          <p:cNvPr id="3" name="Content Placeholder 2">
+            <a:extLst>
+              <a:ext uri="{FF2B5EF4-FFF2-40B4-BE49-F238E27FC236}">
+                <a16:creationId xmlns:a16="http://schemas.microsoft.com/office/drawing/2014/main" id="{CB7D5AB3-A691-4ADE-9D65-E61687FE5B9E}"/>
+              </a:ext>
+            </a:extLst>
+          </p:cNvPr>
+          <p:cNvSpPr>
+            <a:spLocks noGrp="1"/>
+          </p:cNvSpPr>
+          <p:nvPr>
+            <p:ph type="body" sz="half" idx="2"/>
+          </p:nvPr>
+        </p:nvSpPr>
+        <p:spPr>
+          <a:xfrm>
+            <a:off x="8477250" y="2386584"/>
+            <a:ext cx="3144774" cy="3511296"/>
+          </a:xfrm>
+        </p:spPr>
+        <p:txBody>
+          <a:bodyPr>
+            <a:normAutofit/>
+          </a:bodyPr>
+          <a:lstStyle/>
+          <a:p>
+            <a:r>
+              <a:rPr lang="en-US" dirty="0"/>
+              <a:t>Using the Machine Learning that we learned in class, we attempted to apply the same methodology and linear regression tools to get our own R-squared value.</a:t>
+            </a:r>
+          </a:p>
+        </p:txBody>
+      </p:sp>
+      <p:pic>
+        <p:nvPicPr>
+          <p:cNvPr id="6" name="Picture 5">
+            <a:extLst>
+              <a:ext uri="{FF2B5EF4-FFF2-40B4-BE49-F238E27FC236}">
+                <a16:creationId xmlns:a16="http://schemas.microsoft.com/office/drawing/2014/main" id="{CA5AA727-FF17-4EC4-9F50-327B0CBC9D40}"/>
+              </a:ext>
+            </a:extLst>
+          </p:cNvPr>
+          <p:cNvPicPr>
+            <a:picLocks noChangeAspect="1"/>
+          </p:cNvPicPr>
+          <p:nvPr/>
+        </p:nvPicPr>
+        <p:blipFill>
+          <a:blip r:embed="rId2"/>
+          <a:stretch>
+            <a:fillRect/>
+          </a:stretch>
+        </p:blipFill>
+        <p:spPr>
+          <a:xfrm>
+            <a:off x="196090" y="280158"/>
+            <a:ext cx="6353175" cy="1228725"/>
+          </a:xfrm>
+          <a:prstGeom prst="rect">
+            <a:avLst/>
+          </a:prstGeom>
+        </p:spPr>
+      </p:pic>
+      <p:pic>
+        <p:nvPicPr>
+          <p:cNvPr id="7" name="Picture 6">
+            <a:extLst>
+              <a:ext uri="{FF2B5EF4-FFF2-40B4-BE49-F238E27FC236}">
+                <a16:creationId xmlns:a16="http://schemas.microsoft.com/office/drawing/2014/main" id="{73F87042-6D4F-4D5D-9072-92A16EF604D0}"/>
+              </a:ext>
+            </a:extLst>
+          </p:cNvPr>
+          <p:cNvPicPr>
+            <a:picLocks noChangeAspect="1"/>
+          </p:cNvPicPr>
+          <p:nvPr/>
+        </p:nvPicPr>
+        <p:blipFill>
+          <a:blip r:embed="rId3"/>
+          <a:stretch>
+            <a:fillRect/>
+          </a:stretch>
+        </p:blipFill>
+        <p:spPr>
+          <a:xfrm>
+            <a:off x="107259" y="1644305"/>
+            <a:ext cx="5238750" cy="2257425"/>
+          </a:xfrm>
+          <a:prstGeom prst="rect">
+            <a:avLst/>
+          </a:prstGeom>
+        </p:spPr>
+      </p:pic>
+      <p:pic>
+        <p:nvPicPr>
+          <p:cNvPr id="8" name="Picture 7">
+            <a:extLst>
+              <a:ext uri="{FF2B5EF4-FFF2-40B4-BE49-F238E27FC236}">
+                <a16:creationId xmlns:a16="http://schemas.microsoft.com/office/drawing/2014/main" id="{0F06D29B-63B8-4D07-82D3-9B0DEDDD3C17}"/>
+              </a:ext>
+            </a:extLst>
+          </p:cNvPr>
+          <p:cNvPicPr>
+            <a:picLocks noChangeAspect="1"/>
+          </p:cNvPicPr>
+          <p:nvPr/>
+        </p:nvPicPr>
+        <p:blipFill>
+          <a:blip r:embed="rId4"/>
+          <a:stretch>
+            <a:fillRect/>
+          </a:stretch>
+        </p:blipFill>
+        <p:spPr>
+          <a:xfrm>
+            <a:off x="117820" y="4037152"/>
+            <a:ext cx="3596931" cy="2466050"/>
+          </a:xfrm>
+          <a:prstGeom prst="rect">
+            <a:avLst/>
+          </a:prstGeom>
+        </p:spPr>
+      </p:pic>
+    </p:spTree>
+    <p:extLst>
+      <p:ext uri="{BB962C8B-B14F-4D97-AF65-F5344CB8AC3E}">
+        <p14:creationId xmlns:p14="http://schemas.microsoft.com/office/powerpoint/2010/main" val="1135428151"/>
       </p:ext>
     </p:extLst>
   </p:cSld>
@@ -8651,7 +8902,7 @@
           <p:cNvPr id="2" name="Title 1">
             <a:extLst>
               <a:ext uri="{FF2B5EF4-FFF2-40B4-BE49-F238E27FC236}">
-                <a16:creationId xmlns:a16="http://schemas.microsoft.com/office/drawing/2014/main" id="{A1CB3ED1-2E78-4E9E-B113-73B111BAC740}"/>
+                <a16:creationId xmlns:a16="http://schemas.microsoft.com/office/drawing/2014/main" id="{7D59C5A6-BA83-44F5-9409-748B6A1D4004}"/>
               </a:ext>
             </a:extLst>
           </p:cNvPr>
@@ -8662,51 +8913,290 @@
             <p:ph type="title"/>
           </p:nvPr>
         </p:nvSpPr>
-        <p:spPr/>
+        <p:spPr>
+          <a:xfrm>
+            <a:off x="8477250" y="603504"/>
+            <a:ext cx="3144774" cy="1645920"/>
+          </a:xfrm>
+        </p:spPr>
         <p:txBody>
-          <a:bodyPr/>
+          <a:bodyPr anchor="b">
+            <a:normAutofit/>
+          </a:bodyPr>
           <a:lstStyle/>
           <a:p>
             <a:r>
               <a:rPr lang="en-US" dirty="0"/>
-              <a:t>Breweries vs. Happiness Score</a:t>
+              <a:t>Machine Learning</a:t>
             </a:r>
           </a:p>
         </p:txBody>
       </p:sp>
-      <p:pic>
-        <p:nvPicPr>
-          <p:cNvPr id="5" name="Content Placeholder 4" descr="A close up of a map&#10;&#10;Description automatically generated">
+      <p:sp>
+        <p:nvSpPr>
+          <p:cNvPr id="3" name="Content Placeholder 2">
             <a:extLst>
               <a:ext uri="{FF2B5EF4-FFF2-40B4-BE49-F238E27FC236}">
-                <a16:creationId xmlns:a16="http://schemas.microsoft.com/office/drawing/2014/main" id="{89544FB2-44C9-4B1C-A6F3-AB5DDD808BE7}"/>
+                <a16:creationId xmlns:a16="http://schemas.microsoft.com/office/drawing/2014/main" id="{CB7D5AB3-A691-4ADE-9D65-E61687FE5B9E}"/>
               </a:ext>
             </a:extLst>
           </p:cNvPr>
-          <p:cNvPicPr>
-            <a:picLocks noGrp="1" noChangeAspect="1"/>
-          </p:cNvPicPr>
+          <p:cNvSpPr>
+            <a:spLocks noGrp="1"/>
+          </p:cNvSpPr>
           <p:nvPr>
-            <p:ph idx="1"/>
+            <p:ph type="body" sz="half" idx="2"/>
           </p:nvPr>
-        </p:nvPicPr>
-        <p:blipFill>
-          <a:blip r:embed="rId2"/>
-          <a:stretch>
-            <a:fillRect/>
-          </a:stretch>
-        </p:blipFill>
+        </p:nvSpPr>
         <p:spPr>
           <a:xfrm>
-            <a:off x="2199633" y="1684421"/>
-            <a:ext cx="9369731" cy="4612463"/>
+            <a:off x="8477250" y="2386584"/>
+            <a:ext cx="3144774" cy="3511296"/>
           </a:xfrm>
         </p:spPr>
-      </p:pic>
+        <p:txBody>
+          <a:bodyPr>
+            <a:normAutofit/>
+          </a:bodyPr>
+          <a:lstStyle/>
+          <a:p>
+            <a:r>
+              <a:rPr lang="en-US" dirty="0"/>
+              <a:t>Tried different column values and both linear and polynomial regression tests</a:t>
+            </a:r>
+          </a:p>
+          <a:p>
+            <a:endParaRPr lang="en-US" dirty="0"/>
+          </a:p>
+          <a:p>
+            <a:endParaRPr lang="en-US" dirty="0"/>
+          </a:p>
+          <a:p>
+            <a:pPr algn="ctr"/>
+            <a:r>
+              <a:rPr lang="en-US" b="1" dirty="0"/>
+              <a:t>NO CORRELATION BETWEEN OUR DATA VALUES AND HAPPINESS</a:t>
+            </a:r>
+          </a:p>
+          <a:p>
+            <a:endParaRPr lang="en-US" dirty="0"/>
+          </a:p>
+        </p:txBody>
+      </p:sp>
+      <p:sp>
+        <p:nvSpPr>
+          <p:cNvPr id="7" name="TextBox 6">
+            <a:extLst>
+              <a:ext uri="{FF2B5EF4-FFF2-40B4-BE49-F238E27FC236}">
+                <a16:creationId xmlns:a16="http://schemas.microsoft.com/office/drawing/2014/main" id="{F6D623DE-F9BB-4929-9949-C02D4D834265}"/>
+              </a:ext>
+            </a:extLst>
+          </p:cNvPr>
+          <p:cNvSpPr txBox="1"/>
+          <p:nvPr/>
+        </p:nvSpPr>
+        <p:spPr>
+          <a:xfrm>
+            <a:off x="336994" y="397401"/>
+            <a:ext cx="7688062" cy="5570756"/>
+          </a:xfrm>
+          <a:prstGeom prst="rect">
+            <a:avLst/>
+          </a:prstGeom>
+          <a:noFill/>
+        </p:spPr>
+        <p:txBody>
+          <a:bodyPr wrap="square" rtlCol="0">
+            <a:spAutoFit/>
+          </a:bodyPr>
+          <a:lstStyle/>
+          <a:p>
+            <a:r>
+              <a:rPr lang="en-US" b="1" dirty="0"/>
+              <a:t>Tests against Total Happiness Score</a:t>
+            </a:r>
+          </a:p>
+          <a:p>
+            <a:endParaRPr lang="en-US" u="sng" dirty="0"/>
+          </a:p>
+          <a:p>
+            <a:r>
+              <a:rPr lang="en-US" sz="1600" u="sng" dirty="0"/>
+              <a:t>Columns:</a:t>
+            </a:r>
+          </a:p>
+          <a:p>
+            <a:r>
+              <a:rPr lang="en-US" sz="1600" dirty="0"/>
+              <a:t>"population", "income", "</a:t>
+            </a:r>
+            <a:r>
+              <a:rPr lang="en-US" sz="1600" dirty="0" err="1"/>
+              <a:t>total_breweries</a:t>
+            </a:r>
+            <a:r>
+              <a:rPr lang="en-US" sz="1600" dirty="0"/>
+              <a:t>", "wineries", "</a:t>
+            </a:r>
+            <a:r>
+              <a:rPr lang="en-US" sz="1600" dirty="0" err="1"/>
+              <a:t>avg_temp</a:t>
+            </a:r>
+            <a:r>
+              <a:rPr lang="en-US" sz="1600" dirty="0"/>
+              <a:t>"</a:t>
+            </a:r>
+          </a:p>
+          <a:p>
+            <a:r>
+              <a:rPr lang="en-US" sz="1600" dirty="0"/>
+              <a:t>      Linear Regression: 	R2 = .41</a:t>
+            </a:r>
+          </a:p>
+          <a:p>
+            <a:r>
+              <a:rPr lang="en-US" sz="1600" dirty="0"/>
+              <a:t>      Polynomial Regression: 	R2 = -1.9</a:t>
+            </a:r>
+          </a:p>
+          <a:p>
+            <a:endParaRPr lang="en-US" sz="1600" dirty="0"/>
+          </a:p>
+          <a:p>
+            <a:r>
+              <a:rPr lang="en-US" sz="1600" dirty="0"/>
+              <a:t>"population", "income", "</a:t>
+            </a:r>
+            <a:r>
+              <a:rPr lang="en-US" sz="1600" dirty="0" err="1"/>
+              <a:t>total_breweries</a:t>
+            </a:r>
+            <a:r>
+              <a:rPr lang="en-US" sz="1600" dirty="0"/>
+              <a:t>", "</a:t>
+            </a:r>
+            <a:r>
+              <a:rPr lang="en-US" sz="1600" dirty="0" err="1"/>
+              <a:t>avg_temp</a:t>
+            </a:r>
+            <a:r>
+              <a:rPr lang="en-US" sz="1600" dirty="0"/>
+              <a:t>"</a:t>
+            </a:r>
+          </a:p>
+          <a:p>
+            <a:r>
+              <a:rPr lang="en-US" sz="1600" dirty="0"/>
+              <a:t>      Linear Regression: 	R2 = .43</a:t>
+            </a:r>
+          </a:p>
+          <a:p>
+            <a:r>
+              <a:rPr lang="en-US" sz="1600" dirty="0"/>
+              <a:t>      Polynomial Regression: 	R2 = .13</a:t>
+            </a:r>
+          </a:p>
+          <a:p>
+            <a:endParaRPr lang="en-US" sz="1600" dirty="0"/>
+          </a:p>
+          <a:p>
+            <a:r>
+              <a:rPr lang="en-US" sz="1600" dirty="0"/>
+              <a:t>"income", "</a:t>
+            </a:r>
+            <a:r>
+              <a:rPr lang="en-US" sz="1600" dirty="0" err="1"/>
+              <a:t>total_breweries</a:t>
+            </a:r>
+            <a:r>
+              <a:rPr lang="en-US" sz="1600" dirty="0"/>
+              <a:t>", "</a:t>
+            </a:r>
+            <a:r>
+              <a:rPr lang="en-US" sz="1600" dirty="0" err="1"/>
+              <a:t>avg_temp</a:t>
+            </a:r>
+            <a:r>
+              <a:rPr lang="en-US" sz="1600" dirty="0"/>
+              <a:t>"</a:t>
+            </a:r>
+          </a:p>
+          <a:p>
+            <a:r>
+              <a:rPr lang="en-US" sz="1600" dirty="0"/>
+              <a:t>      Linear Regression: 	R2 = .48</a:t>
+            </a:r>
+          </a:p>
+          <a:p>
+            <a:r>
+              <a:rPr lang="en-US" sz="1600" dirty="0"/>
+              <a:t>      Polynomial Regression: 	R2 = .40</a:t>
+            </a:r>
+          </a:p>
+          <a:p>
+            <a:endParaRPr lang="en-US" sz="1600" dirty="0"/>
+          </a:p>
+          <a:p>
+            <a:r>
+              <a:rPr lang="en-US" sz="1600" dirty="0"/>
+              <a:t>"income", "</a:t>
+            </a:r>
+            <a:r>
+              <a:rPr lang="en-US" sz="1600" dirty="0" err="1"/>
+              <a:t>total_breweries</a:t>
+            </a:r>
+            <a:r>
+              <a:rPr lang="en-US" sz="1600" dirty="0"/>
+              <a:t>""</a:t>
+            </a:r>
+          </a:p>
+          <a:p>
+            <a:r>
+              <a:rPr lang="en-US" sz="1600" dirty="0"/>
+              <a:t>      Linear Regression: 	R2 = .40</a:t>
+            </a:r>
+          </a:p>
+          <a:p>
+            <a:r>
+              <a:rPr lang="en-US" sz="1600" dirty="0"/>
+              <a:t>      Polynomial Regression: 	R2 = .40</a:t>
+            </a:r>
+          </a:p>
+          <a:p>
+            <a:endParaRPr lang="en-US" sz="1600" dirty="0"/>
+          </a:p>
+          <a:p>
+            <a:r>
+              <a:rPr lang="en-US" sz="1600" dirty="0"/>
+              <a:t>"population", "</a:t>
+            </a:r>
+            <a:r>
+              <a:rPr lang="en-US" sz="1600" dirty="0" err="1"/>
+              <a:t>total_breweries</a:t>
+            </a:r>
+            <a:r>
+              <a:rPr lang="en-US" sz="1600" dirty="0"/>
+              <a:t>""</a:t>
+            </a:r>
+          </a:p>
+          <a:p>
+            <a:r>
+              <a:rPr lang="en-US" sz="1600" dirty="0"/>
+              <a:t>      Linear Regression: 	R2 = -.88</a:t>
+            </a:r>
+          </a:p>
+          <a:p>
+            <a:r>
+              <a:rPr lang="en-US" sz="1600" dirty="0"/>
+              <a:t>      Polynomial Regression: 	R2 = -.83</a:t>
+            </a:r>
+          </a:p>
+        </p:txBody>
+      </p:sp>
     </p:spTree>
     <p:extLst>
       <p:ext uri="{BB962C8B-B14F-4D97-AF65-F5344CB8AC3E}">
-        <p14:creationId xmlns:p14="http://schemas.microsoft.com/office/powerpoint/2010/main" val="2040439502"/>
+        <p14:creationId xmlns:p14="http://schemas.microsoft.com/office/powerpoint/2010/main" val="3881337227"/>
       </p:ext>
     </p:extLst>
   </p:cSld>
@@ -8733,12 +9223,48 @@
           <a:chExt cx="0" cy="0"/>
         </a:xfrm>
       </p:grpSpPr>
+      <p:pic>
+        <p:nvPicPr>
+          <p:cNvPr id="4" name="Picture 3" descr="A bottle of wine&#10;&#10;Description automatically generated">
+            <a:extLst>
+              <a:ext uri="{FF2B5EF4-FFF2-40B4-BE49-F238E27FC236}">
+                <a16:creationId xmlns:a16="http://schemas.microsoft.com/office/drawing/2014/main" id="{1442C429-341F-4DF3-A85C-4860A8F24FC5}"/>
+              </a:ext>
+            </a:extLst>
+          </p:cNvPr>
+          <p:cNvPicPr>
+            <a:picLocks noChangeAspect="1"/>
+          </p:cNvPicPr>
+          <p:nvPr/>
+        </p:nvPicPr>
+        <p:blipFill>
+          <a:blip r:embed="rId2"/>
+          <a:stretch>
+            <a:fillRect/>
+          </a:stretch>
+        </p:blipFill>
+        <p:spPr>
+          <a:xfrm>
+            <a:off x="0" y="0"/>
+            <a:ext cx="12191999" cy="6981754"/>
+          </a:xfrm>
+          <a:prstGeom prst="rect">
+            <a:avLst/>
+          </a:prstGeom>
+          <a:blipFill>
+            <a:blip r:embed="rId2"/>
+            <a:stretch>
+              <a:fillRect/>
+            </a:stretch>
+          </a:blipFill>
+        </p:spPr>
+      </p:pic>
       <p:sp>
         <p:nvSpPr>
           <p:cNvPr id="2" name="Title 1">
             <a:extLst>
               <a:ext uri="{FF2B5EF4-FFF2-40B4-BE49-F238E27FC236}">
-                <a16:creationId xmlns:a16="http://schemas.microsoft.com/office/drawing/2014/main" id="{381ECE03-28E2-4794-BBB5-37003229C94A}"/>
+                <a16:creationId xmlns:a16="http://schemas.microsoft.com/office/drawing/2014/main" id="{70C4A108-ADFD-47BA-9B82-3B38A9B923A4}"/>
               </a:ext>
             </a:extLst>
           </p:cNvPr>
@@ -8749,64 +9275,35 @@
             <p:ph type="title"/>
           </p:nvPr>
         </p:nvSpPr>
-        <p:spPr/>
+        <p:spPr>
+          <a:xfrm>
+            <a:off x="998048" y="2743200"/>
+            <a:ext cx="10058400" cy="1371600"/>
+          </a:xfrm>
+          <a:solidFill>
+            <a:schemeClr val="tx1"/>
+          </a:solidFill>
+        </p:spPr>
         <p:txBody>
           <a:bodyPr/>
           <a:lstStyle/>
           <a:p>
-            <a:r>
-              <a:rPr lang="en-US" dirty="0"/>
-              <a:t>Wineries vs. Happiness Score</a:t>
+            <a:pPr algn="ctr"/>
+            <a:r>
+              <a:rPr lang="en-US" dirty="0">
+                <a:solidFill>
+                  <a:schemeClr val="bg1"/>
+                </a:solidFill>
+              </a:rPr>
+              <a:t>TABLEAU</a:t>
             </a:r>
           </a:p>
         </p:txBody>
       </p:sp>
-      <p:pic>
-        <p:nvPicPr>
-          <p:cNvPr id="5" name="Content Placeholder 4" descr="A close up of a map&#10;&#10;Description automatically generated">
-            <a:extLst>
-              <a:ext uri="{FF2B5EF4-FFF2-40B4-BE49-F238E27FC236}">
-                <a16:creationId xmlns:a16="http://schemas.microsoft.com/office/drawing/2014/main" id="{6E6BDC56-2D04-4B3A-A251-B3C500B80DF0}"/>
-              </a:ext>
-            </a:extLst>
-          </p:cNvPr>
-          <p:cNvPicPr>
-            <a:picLocks noGrp="1" noChangeAspect="1"/>
-          </p:cNvPicPr>
-          <p:nvPr>
-            <p:ph idx="1"/>
-          </p:nvPr>
-        </p:nvPicPr>
-        <p:blipFill>
-          <a:blip r:embed="rId2"/>
-          <a:stretch>
-            <a:fillRect/>
-          </a:stretch>
-        </p:blipFill>
-        <p:spPr>
-          <a:xfrm>
-            <a:off x="2099976" y="1615671"/>
-            <a:ext cx="9500339" cy="4722466"/>
-          </a:xfrm>
-          <a:prstGeom prst="rect">
-            <a:avLst/>
-          </a:prstGeom>
-          <a:ln>
-            <a:noFill/>
-          </a:ln>
-          <a:effectLst>
-            <a:outerShdw blurRad="292100" dist="139700" dir="2700000" algn="tl" rotWithShape="0">
-              <a:srgbClr val="333333">
-                <a:alpha val="65000"/>
-              </a:srgbClr>
-            </a:outerShdw>
-          </a:effectLst>
-        </p:spPr>
-      </p:pic>
     </p:spTree>
     <p:extLst>
       <p:ext uri="{BB962C8B-B14F-4D97-AF65-F5344CB8AC3E}">
-        <p14:creationId xmlns:p14="http://schemas.microsoft.com/office/powerpoint/2010/main" val="2828089976"/>
+        <p14:creationId xmlns:p14="http://schemas.microsoft.com/office/powerpoint/2010/main" val="967810589"/>
       </p:ext>
     </p:extLst>
   </p:cSld>
@@ -9314,21 +9811,21 @@
 </file>
 
 <file path=customXml/item2.xml><?xml version="1.0" encoding="utf-8"?>
+<p:properties xmlns:p="http://schemas.microsoft.com/office/2006/metadata/properties" xmlns:xsi="http://www.w3.org/2001/XMLSchema-instance" xmlns:pc="http://schemas.microsoft.com/office/infopath/2007/PartnerControls">
+  <documentManagement>
+    <Status xmlns="71af3243-3dd4-4a8d-8c0d-dd76da1f02a5">Not started</Status>
+    <MediaServiceKeyPoints xmlns="71af3243-3dd4-4a8d-8c0d-dd76da1f02a5" xsi:nil="true"/>
+  </documentManagement>
+</p:properties>
+</file>
+
+<file path=customXml/item3.xml><?xml version="1.0" encoding="utf-8"?>
 <?mso-contentType ?>
 <FormTemplates xmlns="http://schemas.microsoft.com/sharepoint/v3/contenttype/forms">
   <Display>DocumentLibraryForm</Display>
   <Edit>DocumentLibraryForm</Edit>
   <New>DocumentLibraryForm</New>
 </FormTemplates>
-</file>
-
-<file path=customXml/item3.xml><?xml version="1.0" encoding="utf-8"?>
-<p:properties xmlns:p="http://schemas.microsoft.com/office/2006/metadata/properties" xmlns:xsi="http://www.w3.org/2001/XMLSchema-instance" xmlns:pc="http://schemas.microsoft.com/office/infopath/2007/PartnerControls">
-  <documentManagement>
-    <Status xmlns="71af3243-3dd4-4a8d-8c0d-dd76da1f02a5">Not started</Status>
-    <MediaServiceKeyPoints xmlns="71af3243-3dd4-4a8d-8c0d-dd76da1f02a5" xsi:nil="true"/>
-  </documentManagement>
-</p:properties>
 </file>
 
 <file path=customXml/itemProps1.xml><?xml version="1.0" encoding="utf-8"?>
@@ -9351,14 +9848,6 @@
 </file>
 
 <file path=customXml/itemProps2.xml><?xml version="1.0" encoding="utf-8"?>
-<ds:datastoreItem xmlns:ds="http://schemas.openxmlformats.org/officeDocument/2006/customXml" ds:itemID="{CDB58277-F8DF-46FF-84EC-EF41B835E69F}">
-  <ds:schemaRefs>
-    <ds:schemaRef ds:uri="http://schemas.microsoft.com/sharepoint/v3/contenttype/forms"/>
-  </ds:schemaRefs>
-</ds:datastoreItem>
-</file>
-
-<file path=customXml/itemProps3.xml><?xml version="1.0" encoding="utf-8"?>
 <ds:datastoreItem xmlns:ds="http://schemas.openxmlformats.org/officeDocument/2006/customXml" ds:itemID="{137651BA-F45C-4845-9AB3-E0A65B39F5E1}">
   <ds:schemaRefs>
     <ds:schemaRef ds:uri="http://schemas.microsoft.com/office/2006/metadata/properties"/>
@@ -9366,4 +9855,12 @@
     <ds:schemaRef ds:uri="71af3243-3dd4-4a8d-8c0d-dd76da1f02a5"/>
   </ds:schemaRefs>
 </ds:datastoreItem>
+</file>
+
+<file path=customXml/itemProps3.xml><?xml version="1.0" encoding="utf-8"?>
+<ds:datastoreItem xmlns:ds="http://schemas.openxmlformats.org/officeDocument/2006/customXml" ds:itemID="{CDB58277-F8DF-46FF-84EC-EF41B835E69F}">
+  <ds:schemaRefs>
+    <ds:schemaRef ds:uri="http://schemas.microsoft.com/sharepoint/v3/contenttype/forms"/>
+  </ds:schemaRefs>
+</ds:datastoreItem>
 </file>
</xml_diff>